<commit_message>
added a backend problem
</commit_message>
<xml_diff>
--- a/Documentation/reports/Presentation.pptx
+++ b/Documentation/reports/Presentation.pptx
@@ -294,7 +294,7 @@
 <file path=ppt/charts/chart1.xml><?xml version="1.0" encoding="utf-8"?>
 <c:chartSpace xmlns:c="http://schemas.openxmlformats.org/drawingml/2006/chart" xmlns:a="http://schemas.openxmlformats.org/drawingml/2006/main" xmlns:r="http://schemas.openxmlformats.org/officeDocument/2006/relationships" xmlns:c16r2="http://schemas.microsoft.com/office/drawing/2015/06/chart">
   <c:date1904 val="0"/>
-  <c:lang val="en-GB"/>
+  <c:lang val="en-US"/>
   <c:roundedCorners val="0"/>
   <mc:AlternateContent xmlns:mc="http://schemas.openxmlformats.org/markup-compatibility/2006">
     <mc:Choice xmlns:c14="http://schemas.microsoft.com/office/drawing/2007/8/2/chart" Requires="c14">
@@ -8939,7 +8939,7 @@
             <a:pPr rtl="0"/>
             <a:fld id="{D34942C2-9BB4-485B-BAA9-2B22AB8C8143}" type="datetime1">
               <a:rPr lang="en-GB" smtClean="0"/>
-              <a:t>01/05/2023</a:t>
+              <a:t>03/05/2023</a:t>
             </a:fld>
             <a:endParaRPr lang="en-GB"/>
           </a:p>
@@ -9121,7 +9121,7 @@
             <a:pPr rtl="0"/>
             <a:fld id="{C46B0483-5E48-4989-812C-4FF58E3186C6}" type="datetime1">
               <a:rPr lang="en-GB" noProof="0" smtClean="0"/>
-              <a:t>01/05/2023</a:t>
+              <a:t>03/05/2023</a:t>
             </a:fld>
             <a:endParaRPr lang="en-GB" noProof="0"/>
           </a:p>
@@ -10008,7 +10008,7 @@
             <a:pPr rtl="0"/>
             <a:fld id="{6829274C-2AF6-43C6-BE37-6B723526AB66}" type="datetime1">
               <a:rPr lang="en-GB" noProof="0" smtClean="0"/>
-              <a:t>01/05/2023</a:t>
+              <a:t>03/05/2023</a:t>
             </a:fld>
             <a:endParaRPr lang="en-GB" noProof="0"/>
           </a:p>
@@ -10281,7 +10281,7 @@
             <a:pPr rtl="0"/>
             <a:fld id="{AC3B16FD-AF9A-4B37-B857-ABF0C7FEB2C0}" type="datetime1">
               <a:rPr lang="en-GB" noProof="0" smtClean="0"/>
-              <a:t>01/05/2023</a:t>
+              <a:t>03/05/2023</a:t>
             </a:fld>
             <a:endParaRPr lang="en-GB" noProof="0"/>
           </a:p>
@@ -10473,7 +10473,7 @@
             <a:pPr rtl="0"/>
             <a:fld id="{E8D02A09-1629-4FE8-9008-2360C6AF6524}" type="datetime1">
               <a:rPr lang="en-GB" noProof="0" smtClean="0"/>
-              <a:t>01/05/2023</a:t>
+              <a:t>03/05/2023</a:t>
             </a:fld>
             <a:endParaRPr lang="en-GB" noProof="0"/>
           </a:p>
@@ -10739,7 +10739,7 @@
             <a:pPr rtl="0"/>
             <a:fld id="{ACBF031D-5EAA-4834-BC4C-6B8D41D2A31A}" type="datetime1">
               <a:rPr lang="en-GB" noProof="0" smtClean="0"/>
-              <a:t>01/05/2023</a:t>
+              <a:t>03/05/2023</a:t>
             </a:fld>
             <a:endParaRPr lang="en-GB" noProof="0"/>
           </a:p>
@@ -11069,7 +11069,7 @@
             <a:pPr rtl="0"/>
             <a:fld id="{0C153F27-CCB5-42A9-917D-A5C19EF4A37A}" type="datetime1">
               <a:rPr lang="en-GB" noProof="0" smtClean="0"/>
-              <a:t>01/05/2023</a:t>
+              <a:t>03/05/2023</a:t>
             </a:fld>
             <a:endParaRPr lang="en-GB" noProof="0"/>
           </a:p>
@@ -11677,7 +11677,7 @@
             <a:pPr rtl="0"/>
             <a:fld id="{C22FEF4C-3D16-4233-ACC2-6B3BE0338E94}" type="datetime1">
               <a:rPr lang="en-GB" noProof="0" smtClean="0"/>
-              <a:t>01/05/2023</a:t>
+              <a:t>03/05/2023</a:t>
             </a:fld>
             <a:endParaRPr lang="en-GB" noProof="0"/>
           </a:p>
@@ -12522,7 +12522,7 @@
             <a:pPr rtl="0"/>
             <a:fld id="{236F4546-A12E-4834-AE1D-19A2BD9FE491}" type="datetime1">
               <a:rPr lang="en-GB" noProof="0" smtClean="0"/>
-              <a:t>01/05/2023</a:t>
+              <a:t>03/05/2023</a:t>
             </a:fld>
             <a:endParaRPr lang="en-GB" noProof="0"/>
           </a:p>
@@ -12689,7 +12689,7 @@
             <a:pPr rtl="0"/>
             <a:fld id="{FBFC8BA5-C8F4-44E9-81D3-9993FAFC2548}" type="datetime1">
               <a:rPr lang="en-GB" noProof="0" smtClean="0"/>
-              <a:t>01/05/2023</a:t>
+              <a:t>03/05/2023</a:t>
             </a:fld>
             <a:endParaRPr lang="en-GB" noProof="0"/>
           </a:p>
@@ -12866,7 +12866,7 @@
             <a:pPr rtl="0"/>
             <a:fld id="{A164976D-C0DD-4100-93A1-CFA745D94DB1}" type="datetime1">
               <a:rPr lang="en-GB" noProof="0" smtClean="0"/>
-              <a:t>01/05/2023</a:t>
+              <a:t>03/05/2023</a:t>
             </a:fld>
             <a:endParaRPr lang="en-GB" noProof="0"/>
           </a:p>
@@ -13033,7 +13033,7 @@
             <a:pPr rtl="0"/>
             <a:fld id="{2288F526-2C2E-4DB7-8655-C1E08D2E237C}" type="datetime1">
               <a:rPr lang="en-GB" noProof="0" smtClean="0"/>
-              <a:t>01/05/2023</a:t>
+              <a:t>03/05/2023</a:t>
             </a:fld>
             <a:endParaRPr lang="en-GB" noProof="0"/>
           </a:p>
@@ -13275,7 +13275,7 @@
             <a:pPr rtl="0"/>
             <a:fld id="{2FF95D3A-6098-4E79-BE61-296F9A23A1CB}" type="datetime1">
               <a:rPr lang="en-GB" noProof="0" smtClean="0"/>
-              <a:t>01/05/2023</a:t>
+              <a:t>03/05/2023</a:t>
             </a:fld>
             <a:endParaRPr lang="en-GB" noProof="0"/>
           </a:p>
@@ -13563,7 +13563,7 @@
             <a:pPr rtl="0"/>
             <a:fld id="{03CF9A9B-64FA-486B-B1C4-20B3C2842FAF}" type="datetime1">
               <a:rPr lang="en-GB" noProof="0" smtClean="0"/>
-              <a:t>01/05/2023</a:t>
+              <a:t>03/05/2023</a:t>
             </a:fld>
             <a:endParaRPr lang="en-GB" noProof="0"/>
           </a:p>
@@ -13997,7 +13997,7 @@
             <a:pPr rtl="0"/>
             <a:fld id="{8B9A1C3B-3411-4F1E-9257-FBE0BF08E35E}" type="datetime1">
               <a:rPr lang="en-GB" noProof="0" smtClean="0"/>
-              <a:t>01/05/2023</a:t>
+              <a:t>03/05/2023</a:t>
             </a:fld>
             <a:endParaRPr lang="en-GB" noProof="0"/>
           </a:p>
@@ -14113,7 +14113,7 @@
             <a:pPr rtl="0"/>
             <a:fld id="{6E7AE7EA-47F8-43A2-A0A9-1464253F1FF5}" type="datetime1">
               <a:rPr lang="en-GB" noProof="0" smtClean="0"/>
-              <a:t>01/05/2023</a:t>
+              <a:t>03/05/2023</a:t>
             </a:fld>
             <a:endParaRPr lang="en-GB" noProof="0"/>
           </a:p>
@@ -14206,7 +14206,7 @@
             <a:pPr rtl="0"/>
             <a:fld id="{8F3FAFEF-9964-4E62-A619-7F95A52237F8}" type="datetime1">
               <a:rPr lang="en-GB" noProof="0" smtClean="0"/>
-              <a:t>01/05/2023</a:t>
+              <a:t>03/05/2023</a:t>
             </a:fld>
             <a:endParaRPr lang="en-GB" noProof="0"/>
           </a:p>
@@ -14482,7 +14482,7 @@
             <a:pPr rtl="0"/>
             <a:fld id="{2583AF05-3F56-48E3-A521-2AA72E075177}" type="datetime1">
               <a:rPr lang="en-GB" noProof="0" smtClean="0"/>
-              <a:t>01/05/2023</a:t>
+              <a:t>03/05/2023</a:t>
             </a:fld>
             <a:endParaRPr lang="en-GB" noProof="0"/>
           </a:p>
@@ -14755,7 +14755,7 @@
             <a:pPr rtl="0"/>
             <a:fld id="{DC9ABC9C-6733-4B3C-8D3C-F33F0A5CEBCB}" type="datetime1">
               <a:rPr lang="en-GB" noProof="0" smtClean="0"/>
-              <a:t>01/05/2023</a:t>
+              <a:t>03/05/2023</a:t>
             </a:fld>
             <a:endParaRPr lang="en-GB" noProof="0"/>
           </a:p>
@@ -15181,7 +15181,7 @@
             <a:pPr rtl="0"/>
             <a:fld id="{05BD160B-B06D-4D6D-8099-7D9F4028ABFA}" type="datetime1">
               <a:rPr lang="en-GB" noProof="0" smtClean="0"/>
-              <a:t>01/05/2023</a:t>
+              <a:t>03/05/2023</a:t>
             </a:fld>
             <a:endParaRPr lang="en-GB" noProof="0"/>
           </a:p>
@@ -16819,21 +16819,24 @@
                 <a:ea typeface="Calibri" panose="020F0502020204030204" pitchFamily="34" charset="0"/>
                 <a:cs typeface="Times New Roman" panose="02020603050405020304" pitchFamily="18" charset="0"/>
               </a:rPr>
-              <a:t>The Booking function currently implemented within the Mens Shed web app is currently just </a:t>
+              <a:t>The Booking function currently implemented within the Mens Shed web app is currently just a prototype.</a:t>
             </a:r>
+          </a:p>
+          <a:p>
             <a:r>
-              <a:rPr lang="en-GB" sz="2000">
-                <a:effectLst/>
+              <a:rPr lang="en-GB" dirty="0">
                 <a:latin typeface="Arial" panose="020B0604020202020204" pitchFamily="34" charset="0"/>
                 <a:ea typeface="Calibri" panose="020F0502020204030204" pitchFamily="34" charset="0"/>
                 <a:cs typeface="Times New Roman" panose="02020603050405020304" pitchFamily="18" charset="0"/>
               </a:rPr>
-              <a:t>a prototype.</a:t>
+              <a:t>The database itself can not store graphic images</a:t>
             </a:r>
-          </a:p>
-          <a:p>
-            <a:pPr lvl="1"/>
-            <a:endParaRPr lang="en-GB" dirty="0"/>
+            <a:endParaRPr lang="en-GB" sz="2000" dirty="0">
+              <a:effectLst/>
+              <a:latin typeface="Arial" panose="020B0604020202020204" pitchFamily="34" charset="0"/>
+              <a:ea typeface="Calibri" panose="020F0502020204030204" pitchFamily="34" charset="0"/>
+              <a:cs typeface="Times New Roman" panose="02020603050405020304" pitchFamily="18" charset="0"/>
+            </a:endParaRPr>
           </a:p>
         </p:txBody>
       </p:sp>
@@ -18351,6 +18354,24 @@
 </file>
 
 <file path=customXml/item1.xml><?xml version="1.0" encoding="utf-8"?>
+<?mso-contentType ?>
+<FormTemplates xmlns="http://schemas.microsoft.com/sharepoint/v3/contenttype/forms">
+  <Display>DocumentLibraryForm</Display>
+  <Edit>DocumentLibraryForm</Edit>
+  <New>DocumentLibraryForm</New>
+</FormTemplates>
+</file>
+
+<file path=customXml/item2.xml><?xml version="1.0" encoding="utf-8"?>
+<p:properties xmlns:p="http://schemas.microsoft.com/office/2006/metadata/properties" xmlns:xsi="http://www.w3.org/2001/XMLSchema-instance" xmlns:pc="http://schemas.microsoft.com/office/infopath/2007/PartnerControls">
+  <documentManagement>
+    <Status xmlns="71af3243-3dd4-4a8d-8c0d-dd76da1f02a5">Not started</Status>
+    <MediaServiceKeyPoints xmlns="71af3243-3dd4-4a8d-8c0d-dd76da1f02a5" xsi:nil="true"/>
+  </documentManagement>
+</p:properties>
+</file>
+
+<file path=customXml/item3.xml><?xml version="1.0" encoding="utf-8"?>
 <ct:contentTypeSchema xmlns:ct="http://schemas.microsoft.com/office/2006/metadata/contentType" xmlns:ma="http://schemas.microsoft.com/office/2006/metadata/properties/metaAttributes" ct:_="" ma:_="" ma:contentTypeName="Document" ma:contentTypeID="0x01010079F111ED35F8CC479449609E8A0923A6" ma:contentTypeVersion="12" ma:contentTypeDescription="Create a new document." ma:contentTypeScope="" ma:versionID="93813dd7ca6ad654711aa0ab317e03a3">
   <xsd:schema xmlns:xsd="http://www.w3.org/2001/XMLSchema" xmlns:xs="http://www.w3.org/2001/XMLSchema" xmlns:p="http://schemas.microsoft.com/office/2006/metadata/properties" xmlns:ns2="71af3243-3dd4-4a8d-8c0d-dd76da1f02a5" xmlns:ns3="16c05727-aa75-4e4a-9b5f-8a80a1165891" targetNamespace="http://schemas.microsoft.com/office/2006/metadata/properties" ma:root="true" ma:fieldsID="f11dc0ce689dd3925e84e4e35398c6e7" ns2:_="" ns3:_="">
     <xsd:import namespace="71af3243-3dd4-4a8d-8c0d-dd76da1f02a5"/>
@@ -18571,25 +18592,25 @@
 </ct:contentTypeSchema>
 </file>
 
-<file path=customXml/item2.xml><?xml version="1.0" encoding="utf-8"?>
-<p:properties xmlns:p="http://schemas.microsoft.com/office/2006/metadata/properties" xmlns:xsi="http://www.w3.org/2001/XMLSchema-instance" xmlns:pc="http://schemas.microsoft.com/office/infopath/2007/PartnerControls">
-  <documentManagement>
-    <Status xmlns="71af3243-3dd4-4a8d-8c0d-dd76da1f02a5">Not started</Status>
-    <MediaServiceKeyPoints xmlns="71af3243-3dd4-4a8d-8c0d-dd76da1f02a5" xsi:nil="true"/>
-  </documentManagement>
-</p:properties>
+<file path=customXml/itemProps1.xml><?xml version="1.0" encoding="utf-8"?>
+<ds:datastoreItem xmlns:ds="http://schemas.openxmlformats.org/officeDocument/2006/customXml" ds:itemID="{0D16958A-754B-4396-9457-FD7A427A37DD}">
+  <ds:schemaRefs>
+    <ds:schemaRef ds:uri="http://schemas.microsoft.com/sharepoint/v3/contenttype/forms"/>
+  </ds:schemaRefs>
+</ds:datastoreItem>
 </file>
 
-<file path=customXml/item3.xml><?xml version="1.0" encoding="utf-8"?>
-<?mso-contentType ?>
-<FormTemplates xmlns="http://schemas.microsoft.com/sharepoint/v3/contenttype/forms">
-  <Display>DocumentLibraryForm</Display>
-  <Edit>DocumentLibraryForm</Edit>
-  <New>DocumentLibraryForm</New>
-</FormTemplates>
+<file path=customXml/itemProps2.xml><?xml version="1.0" encoding="utf-8"?>
+<ds:datastoreItem xmlns:ds="http://schemas.openxmlformats.org/officeDocument/2006/customXml" ds:itemID="{048C88F1-1664-415F-AFCE-F6CF45809817}">
+  <ds:schemaRefs>
+    <ds:schemaRef ds:uri="http://schemas.microsoft.com/office/2006/metadata/properties"/>
+    <ds:schemaRef ds:uri="http://schemas.microsoft.com/office/infopath/2007/PartnerControls"/>
+    <ds:schemaRef ds:uri="71af3243-3dd4-4a8d-8c0d-dd76da1f02a5"/>
+  </ds:schemaRefs>
+</ds:datastoreItem>
 </file>
 
-<file path=customXml/itemProps1.xml><?xml version="1.0" encoding="utf-8"?>
+<file path=customXml/itemProps3.xml><?xml version="1.0" encoding="utf-8"?>
 <ds:datastoreItem xmlns:ds="http://schemas.openxmlformats.org/officeDocument/2006/customXml" ds:itemID="{CC30393A-FEC6-4A44-9E4A-6EA49F1F7DC0}">
   <ds:schemaRefs>
     <ds:schemaRef ds:uri="http://schemas.microsoft.com/office/2006/metadata/contentType"/>
@@ -18606,22 +18627,4 @@
     <ds:schemaRef ds:uri="http://schemas.microsoft.com/internal/obd"/>
   </ds:schemaRefs>
 </ds:datastoreItem>
-</file>
-
-<file path=customXml/itemProps2.xml><?xml version="1.0" encoding="utf-8"?>
-<ds:datastoreItem xmlns:ds="http://schemas.openxmlformats.org/officeDocument/2006/customXml" ds:itemID="{048C88F1-1664-415F-AFCE-F6CF45809817}">
-  <ds:schemaRefs>
-    <ds:schemaRef ds:uri="http://schemas.microsoft.com/office/2006/metadata/properties"/>
-    <ds:schemaRef ds:uri="http://schemas.microsoft.com/office/infopath/2007/PartnerControls"/>
-    <ds:schemaRef ds:uri="71af3243-3dd4-4a8d-8c0d-dd76da1f02a5"/>
-  </ds:schemaRefs>
-</ds:datastoreItem>
-</file>
-
-<file path=customXml/itemProps3.xml><?xml version="1.0" encoding="utf-8"?>
-<ds:datastoreItem xmlns:ds="http://schemas.openxmlformats.org/officeDocument/2006/customXml" ds:itemID="{0D16958A-754B-4396-9457-FD7A427A37DD}">
-  <ds:schemaRefs>
-    <ds:schemaRef ds:uri="http://schemas.microsoft.com/sharepoint/v3/contenttype/forms"/>
-  </ds:schemaRefs>
-</ds:datastoreItem>
 </file>
</xml_diff>

<commit_message>
Added more backend tech approaches and limitations
Also added notes alongside the tech approaches and limitations
</commit_message>
<xml_diff>
--- a/Documentation/reports/Presentation.pptx
+++ b/Documentation/reports/Presentation.pptx
@@ -143,13 +143,67 @@
 <file path=ppt/revisionInfo.xml><?xml version="1.0" encoding="utf-8"?>
 <p1510:revInfo xmlns:a="http://schemas.openxmlformats.org/drawingml/2006/main" xmlns:r="http://schemas.openxmlformats.org/officeDocument/2006/relationships" xmlns:p1510="http://schemas.microsoft.com/office/powerpoint/2015/10/main">
   <p1510:revLst>
-    <p1510:client id="{9739205B-C9CF-43A0-B314-E4F28AC02816}" v="14" dt="2023-05-01T12:55:54.529"/>
+    <p1510:client id="{177B5933-113E-4AB9-96A8-DA2B9B27EF29}" v="2" dt="2023-05-03T13:10:06.942"/>
   </p1510:revLst>
 </p1510:revInfo>
 </file>
 
 <file path=ppt/changesInfos/changesInfo1.xml><?xml version="1.0" encoding="utf-8"?>
 <pc:chgInfo xmlns:a="http://schemas.openxmlformats.org/drawingml/2006/main" xmlns:r="http://schemas.openxmlformats.org/officeDocument/2006/relationships" xmlns:ac="http://schemas.microsoft.com/office/drawing/2013/main/command" xmlns:pc="http://schemas.microsoft.com/office/powerpoint/2013/main/command">
+  <pc:docChgLst>
+    <pc:chgData name="Mackintosh, Rory" userId="d813eed5-cbfb-4fdb-9eb6-0da9910ba1ef" providerId="ADAL" clId="{177B5933-113E-4AB9-96A8-DA2B9B27EF29}"/>
+    <pc:docChg chg="custSel modSld">
+      <pc:chgData name="Mackintosh, Rory" userId="d813eed5-cbfb-4fdb-9eb6-0da9910ba1ef" providerId="ADAL" clId="{177B5933-113E-4AB9-96A8-DA2B9B27EF29}" dt="2023-05-03T15:24:15.770" v="1581" actId="20577"/>
+      <pc:docMkLst>
+        <pc:docMk/>
+      </pc:docMkLst>
+      <pc:sldChg chg="modSp mod modNotesTx">
+        <pc:chgData name="Mackintosh, Rory" userId="d813eed5-cbfb-4fdb-9eb6-0da9910ba1ef" providerId="ADAL" clId="{177B5933-113E-4AB9-96A8-DA2B9B27EF29}" dt="2023-05-03T15:22:53.968" v="1326" actId="20577"/>
+        <pc:sldMkLst>
+          <pc:docMk/>
+          <pc:sldMk cId="1094296895" sldId="271"/>
+        </pc:sldMkLst>
+        <pc:spChg chg="mod">
+          <ac:chgData name="Mackintosh, Rory" userId="d813eed5-cbfb-4fdb-9eb6-0da9910ba1ef" providerId="ADAL" clId="{177B5933-113E-4AB9-96A8-DA2B9B27EF29}" dt="2023-05-03T12:42:04.893" v="605" actId="207"/>
+          <ac:spMkLst>
+            <pc:docMk/>
+            <pc:sldMk cId="1094296895" sldId="271"/>
+            <ac:spMk id="3" creationId="{C36FE974-56CC-CB5C-90A1-F0024A1DA4F9}"/>
+          </ac:spMkLst>
+        </pc:spChg>
+      </pc:sldChg>
+      <pc:sldChg chg="modSp mod">
+        <pc:chgData name="Mackintosh, Rory" userId="d813eed5-cbfb-4fdb-9eb6-0da9910ba1ef" providerId="ADAL" clId="{177B5933-113E-4AB9-96A8-DA2B9B27EF29}" dt="2023-05-03T13:10:07.895" v="690" actId="5793"/>
+        <pc:sldMkLst>
+          <pc:docMk/>
+          <pc:sldMk cId="1811381967" sldId="272"/>
+        </pc:sldMkLst>
+        <pc:spChg chg="mod">
+          <ac:chgData name="Mackintosh, Rory" userId="d813eed5-cbfb-4fdb-9eb6-0da9910ba1ef" providerId="ADAL" clId="{177B5933-113E-4AB9-96A8-DA2B9B27EF29}" dt="2023-05-03T13:10:07.895" v="690" actId="5793"/>
+          <ac:spMkLst>
+            <pc:docMk/>
+            <pc:sldMk cId="1811381967" sldId="272"/>
+            <ac:spMk id="3" creationId="{C36FE974-56CC-CB5C-90A1-F0024A1DA4F9}"/>
+          </ac:spMkLst>
+        </pc:spChg>
+      </pc:sldChg>
+      <pc:sldChg chg="modSp mod modNotesTx">
+        <pc:chgData name="Mackintosh, Rory" userId="d813eed5-cbfb-4fdb-9eb6-0da9910ba1ef" providerId="ADAL" clId="{177B5933-113E-4AB9-96A8-DA2B9B27EF29}" dt="2023-05-03T15:24:15.770" v="1581" actId="20577"/>
+        <pc:sldMkLst>
+          <pc:docMk/>
+          <pc:sldMk cId="2507800528" sldId="273"/>
+        </pc:sldMkLst>
+        <pc:spChg chg="mod">
+          <ac:chgData name="Mackintosh, Rory" userId="d813eed5-cbfb-4fdb-9eb6-0da9910ba1ef" providerId="ADAL" clId="{177B5933-113E-4AB9-96A8-DA2B9B27EF29}" dt="2023-05-03T14:25:08.163" v="935" actId="20577"/>
+          <ac:spMkLst>
+            <pc:docMk/>
+            <pc:sldMk cId="2507800528" sldId="273"/>
+            <ac:spMk id="3" creationId="{C36FE974-56CC-CB5C-90A1-F0024A1DA4F9}"/>
+          </ac:spMkLst>
+        </pc:spChg>
+      </pc:sldChg>
+    </pc:docChg>
+  </pc:docChgLst>
   <pc:docChgLst>
     <pc:chgData name="Jack Johnston" userId="c56e8f5f32bf7d06" providerId="LiveId" clId="{9739205B-C9CF-43A0-B314-E4F28AC02816}"/>
     <pc:docChg chg="custSel addSld modSld">
@@ -9610,7 +9664,38 @@
           <a:p>
             <a:r>
               <a:rPr lang="en-GB" dirty="0"/>
-              <a:t>F</a:t>
+              <a:t>SQLite is a database engine library that can be embedded in apps.</a:t>
+            </a:r>
+          </a:p>
+          <a:p>
+            <a:endParaRPr lang="en-GB" dirty="0"/>
+          </a:p>
+          <a:p>
+            <a:r>
+              <a:rPr lang="en-GB" dirty="0"/>
+              <a:t>Flask is a micro web framework written in Python. It is classified as a microframework because it does not require particular tools or libraries.</a:t>
+            </a:r>
+          </a:p>
+          <a:p>
+            <a:endParaRPr lang="en-GB" dirty="0"/>
+          </a:p>
+          <a:p>
+            <a:r>
+              <a:rPr lang="en-GB" dirty="0" err="1"/>
+              <a:t>Bcrypt</a:t>
+            </a:r>
+            <a:r>
+              <a:rPr lang="en-GB" dirty="0"/>
+              <a:t> hashing is used to encrypt users passwords within the database to ensure each users password is secure</a:t>
+            </a:r>
+          </a:p>
+          <a:p>
+            <a:endParaRPr lang="en-GB" dirty="0"/>
+          </a:p>
+          <a:p>
+            <a:r>
+              <a:rPr lang="en-GB" dirty="0"/>
+              <a:t>The SQLite command line can be used to make changes to the SQLite database via the command line e.g. querying the database or giving a user admin access</a:t>
             </a:r>
           </a:p>
         </p:txBody>
@@ -9693,6 +9778,188 @@
         </p:nvSpPr>
         <p:spPr/>
         <p:txBody>
+          <a:bodyPr/>
+          <a:lstStyle/>
+          <a:p>
+            <a:endParaRPr lang="en-GB" dirty="0"/>
+          </a:p>
+        </p:txBody>
+      </p:sp>
+      <p:sp>
+        <p:nvSpPr>
+          <p:cNvPr id="4" name="Slide Number Placeholder 3"/>
+          <p:cNvSpPr>
+            <a:spLocks noGrp="1"/>
+          </p:cNvSpPr>
+          <p:nvPr>
+            <p:ph type="sldNum" sz="quarter" idx="5"/>
+          </p:nvPr>
+        </p:nvSpPr>
+        <p:spPr/>
+        <p:txBody>
+          <a:bodyPr/>
+          <a:lstStyle/>
+          <a:p>
+            <a:pPr rtl="0"/>
+            <a:fld id="{EE000EEB-8338-48D7-8EE8-EE0082EF7602}" type="slidenum">
+              <a:rPr lang="en-GB" noProof="0" smtClean="0"/>
+              <a:t>6</a:t>
+            </a:fld>
+            <a:endParaRPr lang="en-GB" noProof="0"/>
+          </a:p>
+        </p:txBody>
+      </p:sp>
+    </p:spTree>
+    <p:extLst>
+      <p:ext uri="{BB962C8B-B14F-4D97-AF65-F5344CB8AC3E}">
+        <p14:creationId xmlns:p14="http://schemas.microsoft.com/office/powerpoint/2010/main" val="3924257567"/>
+      </p:ext>
+    </p:extLst>
+  </p:cSld>
+  <p:clrMapOvr>
+    <a:masterClrMapping/>
+  </p:clrMapOvr>
+</p:notes>
+</file>
+
+<file path=ppt/notesSlides/notesSlide5.xml><?xml version="1.0" encoding="utf-8"?>
+<p:notes xmlns:a="http://schemas.openxmlformats.org/drawingml/2006/main" xmlns:r="http://schemas.openxmlformats.org/officeDocument/2006/relationships" xmlns:p="http://schemas.openxmlformats.org/presentationml/2006/main">
+  <p:cSld>
+    <p:spTree>
+      <p:nvGrpSpPr>
+        <p:cNvPr id="1" name=""/>
+        <p:cNvGrpSpPr/>
+        <p:nvPr/>
+      </p:nvGrpSpPr>
+      <p:grpSpPr>
+        <a:xfrm>
+          <a:off x="0" y="0"/>
+          <a:ext cx="0" cy="0"/>
+          <a:chOff x="0" y="0"/>
+          <a:chExt cx="0" cy="0"/>
+        </a:xfrm>
+      </p:grpSpPr>
+      <p:sp>
+        <p:nvSpPr>
+          <p:cNvPr id="2" name="Slide Image Placeholder 1"/>
+          <p:cNvSpPr>
+            <a:spLocks noGrp="1" noRot="1" noChangeAspect="1"/>
+          </p:cNvSpPr>
+          <p:nvPr>
+            <p:ph type="sldImg"/>
+          </p:nvPr>
+        </p:nvSpPr>
+        <p:spPr/>
+      </p:sp>
+      <p:sp>
+        <p:nvSpPr>
+          <p:cNvPr id="3" name="Notes Placeholder 2"/>
+          <p:cNvSpPr>
+            <a:spLocks noGrp="1"/>
+          </p:cNvSpPr>
+          <p:nvPr>
+            <p:ph type="body" idx="1"/>
+          </p:nvPr>
+        </p:nvSpPr>
+        <p:spPr/>
+        <p:txBody>
+          <a:bodyPr/>
+          <a:lstStyle/>
+          <a:p>
+            <a:r>
+              <a:rPr lang="en-GB" dirty="0"/>
+              <a:t>The booking function using item ID is only temporary and can be changed later in development.</a:t>
+            </a:r>
+          </a:p>
+          <a:p>
+            <a:endParaRPr lang="en-GB" dirty="0"/>
+          </a:p>
+          <a:p>
+            <a:r>
+              <a:rPr lang="en-GB" dirty="0"/>
+              <a:t>The tool search function can either remove the column for the images or find a way to display the images from the links later in development.</a:t>
+            </a:r>
+          </a:p>
+        </p:txBody>
+      </p:sp>
+      <p:sp>
+        <p:nvSpPr>
+          <p:cNvPr id="4" name="Slide Number Placeholder 3"/>
+          <p:cNvSpPr>
+            <a:spLocks noGrp="1"/>
+          </p:cNvSpPr>
+          <p:nvPr>
+            <p:ph type="sldNum" sz="quarter" idx="5"/>
+          </p:nvPr>
+        </p:nvSpPr>
+        <p:spPr/>
+        <p:txBody>
+          <a:bodyPr/>
+          <a:lstStyle/>
+          <a:p>
+            <a:pPr rtl="0"/>
+            <a:fld id="{EE000EEB-8338-48D7-8EE8-EE0082EF7602}" type="slidenum">
+              <a:rPr lang="en-GB" noProof="0" smtClean="0"/>
+              <a:t>7</a:t>
+            </a:fld>
+            <a:endParaRPr lang="en-GB" noProof="0"/>
+          </a:p>
+        </p:txBody>
+      </p:sp>
+    </p:spTree>
+    <p:extLst>
+      <p:ext uri="{BB962C8B-B14F-4D97-AF65-F5344CB8AC3E}">
+        <p14:creationId xmlns:p14="http://schemas.microsoft.com/office/powerpoint/2010/main" val="3516834243"/>
+      </p:ext>
+    </p:extLst>
+  </p:cSld>
+  <p:clrMapOvr>
+    <a:masterClrMapping/>
+  </p:clrMapOvr>
+</p:notes>
+</file>
+
+<file path=ppt/notesSlides/notesSlide6.xml><?xml version="1.0" encoding="utf-8"?>
+<p:notes xmlns:a="http://schemas.openxmlformats.org/drawingml/2006/main" xmlns:r="http://schemas.openxmlformats.org/officeDocument/2006/relationships" xmlns:p="http://schemas.openxmlformats.org/presentationml/2006/main">
+  <p:cSld>
+    <p:spTree>
+      <p:nvGrpSpPr>
+        <p:cNvPr id="1" name=""/>
+        <p:cNvGrpSpPr/>
+        <p:nvPr/>
+      </p:nvGrpSpPr>
+      <p:grpSpPr>
+        <a:xfrm>
+          <a:off x="0" y="0"/>
+          <a:ext cx="0" cy="0"/>
+          <a:chOff x="0" y="0"/>
+          <a:chExt cx="0" cy="0"/>
+        </a:xfrm>
+      </p:grpSpPr>
+      <p:sp>
+        <p:nvSpPr>
+          <p:cNvPr id="2" name="Slide Image Placeholder 1"/>
+          <p:cNvSpPr>
+            <a:spLocks noGrp="1" noRot="1" noChangeAspect="1"/>
+          </p:cNvSpPr>
+          <p:nvPr>
+            <p:ph type="sldImg"/>
+          </p:nvPr>
+        </p:nvSpPr>
+        <p:spPr/>
+      </p:sp>
+      <p:sp>
+        <p:nvSpPr>
+          <p:cNvPr id="3" name="Notes Placeholder 2"/>
+          <p:cNvSpPr>
+            <a:spLocks noGrp="1"/>
+          </p:cNvSpPr>
+          <p:nvPr>
+            <p:ph type="body" idx="1"/>
+          </p:nvPr>
+        </p:nvSpPr>
+        <p:spPr/>
+        <p:txBody>
           <a:bodyPr rtlCol="0"/>
           <a:lstStyle/>
           <a:p>
@@ -9738,7 +10005,7 @@
 </p:notes>
 </file>
 
-<file path=ppt/notesSlides/notesSlide5.xml><?xml version="1.0" encoding="utf-8"?>
+<file path=ppt/notesSlides/notesSlide7.xml><?xml version="1.0" encoding="utf-8"?>
 <p:notes xmlns:a="http://schemas.openxmlformats.org/drawingml/2006/main" xmlns:r="http://schemas.openxmlformats.org/officeDocument/2006/relationships" xmlns:p="http://schemas.openxmlformats.org/presentationml/2006/main">
   <p:cSld>
     <p:spTree>
@@ -16376,7 +16643,9 @@
           </a:xfrm>
         </p:spPr>
         <p:txBody>
-          <a:bodyPr/>
+          <a:bodyPr>
+            <a:normAutofit lnSpcReduction="10000"/>
+          </a:bodyPr>
           <a:lstStyle/>
           <a:p>
             <a:r>
@@ -16508,6 +16777,112 @@
               </a:rPr>
               <a:t>.</a:t>
             </a:r>
+          </a:p>
+          <a:p>
+            <a:r>
+              <a:rPr lang="en-GB" sz="1800" dirty="0">
+                <a:latin typeface="Arial" panose="020B0604020202020204" pitchFamily="34" charset="0"/>
+                <a:ea typeface="Calibri" panose="020F0502020204030204" pitchFamily="34" charset="0"/>
+                <a:cs typeface="Times New Roman" panose="02020603050405020304" pitchFamily="18" charset="0"/>
+              </a:rPr>
+              <a:t>The Booking function allows users to Book items held within the database for a certain period of time by adding the users booking to the bookings table in the </a:t>
+            </a:r>
+            <a:r>
+              <a:rPr lang="en-GB" sz="1800" dirty="0">
+                <a:solidFill>
+                  <a:srgbClr val="FF0000"/>
+                </a:solidFill>
+                <a:latin typeface="Arial" panose="020B0604020202020204" pitchFamily="34" charset="0"/>
+                <a:ea typeface="Calibri" panose="020F0502020204030204" pitchFamily="34" charset="0"/>
+                <a:cs typeface="Times New Roman" panose="02020603050405020304" pitchFamily="18" charset="0"/>
+              </a:rPr>
+              <a:t>SQLite</a:t>
+            </a:r>
+            <a:r>
+              <a:rPr lang="en-GB" sz="1800" dirty="0">
+                <a:latin typeface="Arial" panose="020B0604020202020204" pitchFamily="34" charset="0"/>
+                <a:ea typeface="Calibri" panose="020F0502020204030204" pitchFamily="34" charset="0"/>
+                <a:cs typeface="Times New Roman" panose="02020603050405020304" pitchFamily="18" charset="0"/>
+              </a:rPr>
+              <a:t> database. The users booking will then be deleted from the </a:t>
+            </a:r>
+            <a:r>
+              <a:rPr lang="en-GB" sz="1800" dirty="0">
+                <a:solidFill>
+                  <a:srgbClr val="FF0000"/>
+                </a:solidFill>
+                <a:latin typeface="Arial" panose="020B0604020202020204" pitchFamily="34" charset="0"/>
+                <a:ea typeface="Calibri" panose="020F0502020204030204" pitchFamily="34" charset="0"/>
+                <a:cs typeface="Times New Roman" panose="02020603050405020304" pitchFamily="18" charset="0"/>
+              </a:rPr>
+              <a:t>SQLite</a:t>
+            </a:r>
+            <a:r>
+              <a:rPr lang="en-GB" sz="1800" dirty="0">
+                <a:latin typeface="Arial" panose="020B0604020202020204" pitchFamily="34" charset="0"/>
+                <a:ea typeface="Calibri" panose="020F0502020204030204" pitchFamily="34" charset="0"/>
+                <a:cs typeface="Times New Roman" panose="02020603050405020304" pitchFamily="18" charset="0"/>
+              </a:rPr>
+              <a:t> database once their booking time ends.</a:t>
+            </a:r>
+          </a:p>
+          <a:p>
+            <a:r>
+              <a:rPr lang="en-GB" sz="1800" dirty="0">
+                <a:effectLst/>
+                <a:latin typeface="Arial" panose="020B0604020202020204" pitchFamily="34" charset="0"/>
+                <a:ea typeface="Calibri" panose="020F0502020204030204" pitchFamily="34" charset="0"/>
+                <a:cs typeface="Times New Roman" panose="02020603050405020304" pitchFamily="18" charset="0"/>
+              </a:rPr>
+              <a:t>The Admin </a:t>
+            </a:r>
+            <a:r>
+              <a:rPr lang="en-GB" sz="1800" dirty="0">
+                <a:latin typeface="Arial" panose="020B0604020202020204" pitchFamily="34" charset="0"/>
+                <a:ea typeface="Calibri" panose="020F0502020204030204" pitchFamily="34" charset="0"/>
+                <a:cs typeface="Times New Roman" panose="02020603050405020304" pitchFamily="18" charset="0"/>
+              </a:rPr>
+              <a:t>access only function allows users who have admin access to enter pages that other users cannot. This is done by setting a users admin access column to true in the </a:t>
+            </a:r>
+            <a:r>
+              <a:rPr lang="en-GB" sz="1800" dirty="0">
+                <a:solidFill>
+                  <a:srgbClr val="FF0000"/>
+                </a:solidFill>
+                <a:latin typeface="Arial" panose="020B0604020202020204" pitchFamily="34" charset="0"/>
+                <a:ea typeface="Calibri" panose="020F0502020204030204" pitchFamily="34" charset="0"/>
+                <a:cs typeface="Times New Roman" panose="02020603050405020304" pitchFamily="18" charset="0"/>
+              </a:rPr>
+              <a:t>SQLite</a:t>
+            </a:r>
+            <a:r>
+              <a:rPr lang="en-GB" sz="1800" dirty="0">
+                <a:latin typeface="Arial" panose="020B0604020202020204" pitchFamily="34" charset="0"/>
+                <a:ea typeface="Calibri" panose="020F0502020204030204" pitchFamily="34" charset="0"/>
+                <a:cs typeface="Times New Roman" panose="02020603050405020304" pitchFamily="18" charset="0"/>
+              </a:rPr>
+              <a:t> database via the </a:t>
+            </a:r>
+            <a:r>
+              <a:rPr lang="en-GB" sz="1800" dirty="0">
+                <a:solidFill>
+                  <a:srgbClr val="FF0000"/>
+                </a:solidFill>
+                <a:latin typeface="Arial" panose="020B0604020202020204" pitchFamily="34" charset="0"/>
+                <a:ea typeface="Calibri" panose="020F0502020204030204" pitchFamily="34" charset="0"/>
+                <a:cs typeface="Times New Roman" panose="02020603050405020304" pitchFamily="18" charset="0"/>
+              </a:rPr>
+              <a:t>SQLite command line.</a:t>
+            </a:r>
+            <a:endParaRPr lang="en-GB" sz="1800" dirty="0">
+              <a:solidFill>
+                <a:srgbClr val="FF0000"/>
+              </a:solidFill>
+              <a:effectLst/>
+              <a:latin typeface="Arial" panose="020B0604020202020204" pitchFamily="34" charset="0"/>
+              <a:ea typeface="Calibri" panose="020F0502020204030204" pitchFamily="34" charset="0"/>
+              <a:cs typeface="Times New Roman" panose="02020603050405020304" pitchFamily="18" charset="0"/>
+            </a:endParaRPr>
           </a:p>
           <a:p>
             <a:endParaRPr lang="en-GB" sz="1800" b="1" dirty="0">
@@ -16709,7 +17084,66 @@
           <a:bodyPr/>
           <a:lstStyle/>
           <a:p>
-            <a:endParaRPr lang="en-GB"/>
+            <a:pPr algn="ctr"/>
+            <a:endParaRPr lang="en-GB" dirty="0"/>
+          </a:p>
+          <a:p>
+            <a:pPr algn="ctr"/>
+            <a:endParaRPr lang="en-GB" dirty="0"/>
+          </a:p>
+          <a:p>
+            <a:pPr algn="ctr"/>
+            <a:endParaRPr lang="en-GB" dirty="0"/>
+          </a:p>
+          <a:p>
+            <a:pPr algn="ctr"/>
+            <a:r>
+              <a:rPr lang="en-GB" dirty="0"/>
+              <a:t>Virtual Environment Deployment: </a:t>
+            </a:r>
+            <a:r>
+              <a:rPr lang="en-GB" dirty="0">
+                <a:hlinkClick r:id="rId3"/>
+              </a:rPr>
+              <a:t>http://127.0.0.1:5000/</a:t>
+            </a:r>
+            <a:endParaRPr lang="en-GB" dirty="0"/>
+          </a:p>
+          <a:p>
+            <a:pPr algn="ctr"/>
+            <a:endParaRPr lang="en-GB" dirty="0"/>
+          </a:p>
+          <a:p>
+            <a:pPr algn="ctr"/>
+            <a:endParaRPr lang="en-GB" dirty="0"/>
+          </a:p>
+          <a:p>
+            <a:pPr algn="ctr"/>
+            <a:endParaRPr lang="en-GB" dirty="0"/>
+          </a:p>
+          <a:p>
+            <a:pPr algn="ctr"/>
+            <a:r>
+              <a:rPr lang="en-GB" dirty="0" err="1"/>
+              <a:t>Pythonanywhere</a:t>
+            </a:r>
+            <a:r>
+              <a:rPr lang="en-GB" dirty="0"/>
+              <a:t> Deployment: </a:t>
+            </a:r>
+            <a:r>
+              <a:rPr lang="en-GB" dirty="0">
+                <a:hlinkClick r:id="rId4"/>
+              </a:rPr>
+              <a:t>http://mensshed.pythonanywhere.com/</a:t>
+            </a:r>
+            <a:endParaRPr lang="en-GB" dirty="0"/>
+          </a:p>
+          <a:p>
+            <a:pPr marL="0" indent="0" algn="ctr">
+              <a:buNone/>
+            </a:pPr>
+            <a:endParaRPr lang="en-GB" dirty="0"/>
           </a:p>
         </p:txBody>
       </p:sp>
@@ -16829,6 +17263,35 @@
                 <a:ea typeface="Calibri" panose="020F0502020204030204" pitchFamily="34" charset="0"/>
                 <a:cs typeface="Times New Roman" panose="02020603050405020304" pitchFamily="18" charset="0"/>
               </a:rPr>
+              <a:t>The Booking function has the user choose an item by item ID which makes it hard to choose the correct item.</a:t>
+            </a:r>
+          </a:p>
+          <a:p>
+            <a:r>
+              <a:rPr lang="en-GB" sz="2000" dirty="0">
+                <a:effectLst/>
+                <a:latin typeface="Arial" panose="020B0604020202020204" pitchFamily="34" charset="0"/>
+                <a:ea typeface="Calibri" panose="020F0502020204030204" pitchFamily="34" charset="0"/>
+                <a:cs typeface="Times New Roman" panose="02020603050405020304" pitchFamily="18" charset="0"/>
+              </a:rPr>
+              <a:t>The tool search function displays the link to pictures rather than the actual ima</a:t>
+            </a:r>
+            <a:r>
+              <a:rPr lang="en-GB" dirty="0">
+                <a:latin typeface="Arial" panose="020B0604020202020204" pitchFamily="34" charset="0"/>
+                <a:ea typeface="Calibri" panose="020F0502020204030204" pitchFamily="34" charset="0"/>
+                <a:cs typeface="Times New Roman" panose="02020603050405020304" pitchFamily="18" charset="0"/>
+              </a:rPr>
+              <a:t>ge.</a:t>
+            </a:r>
+          </a:p>
+          <a:p>
+            <a:r>
+              <a:rPr lang="en-GB" dirty="0">
+                <a:latin typeface="Arial" panose="020B0604020202020204" pitchFamily="34" charset="0"/>
+                <a:ea typeface="Calibri" panose="020F0502020204030204" pitchFamily="34" charset="0"/>
+                <a:cs typeface="Times New Roman" panose="02020603050405020304" pitchFamily="18" charset="0"/>
+              </a:rPr>
               <a:t>The database itself can not store graphic images</a:t>
             </a:r>
             <a:endParaRPr lang="en-GB" sz="2000" dirty="0">
@@ -16837,6 +17300,10 @@
               <a:ea typeface="Calibri" panose="020F0502020204030204" pitchFamily="34" charset="0"/>
               <a:cs typeface="Times New Roman" panose="02020603050405020304" pitchFamily="18" charset="0"/>
             </a:endParaRPr>
+          </a:p>
+          <a:p>
+            <a:pPr lvl="1"/>
+            <a:endParaRPr lang="en-GB" dirty="0"/>
           </a:p>
         </p:txBody>
       </p:sp>

</xml_diff>